<commit_message>
Update Dokumentation + SprintReview
</commit_message>
<xml_diff>
--- a/Scrum_Unterlagen/Reviews/Sprint01_Review.pptx
+++ b/Scrum_Unterlagen/Reviews/Sprint01_Review.pptx
@@ -232,7 +232,7 @@
             </a:pPr>
             <a:fld id="{3953DA5E-C6E2-4FA2-8BC8-7FF9A5EB6734}" type="datetimeFigureOut">
               <a:rPr lang="de-DE"/>
-              <a:t>02.02.2023</a:t>
+              <a:t>08.02.2023</a:t>
             </a:fld>
             <a:endParaRPr lang="de-DE"/>
           </a:p>
@@ -413,7 +413,7 @@
           <a:p>
             <a:fld id="{88DE360A-102B-474E-BEC0-79AC7566E430}" type="datetimeFigureOut">
               <a:rPr lang="en-US" smtClean="0"/>
-              <a:t>2/2/2023</a:t>
+              <a:t>2/8/2023</a:t>
             </a:fld>
             <a:endParaRPr lang="en-US"/>
           </a:p>
@@ -4740,7 +4740,7 @@
               <a:rPr lang="de-DE" altLang="de-AT" sz="3600" dirty="0">
                 <a:cs typeface="+mj-lt"/>
               </a:rPr>
-              <a:t>Sprint 1 (25.01 - 09.02)</a:t>
+              <a:t>Sprint 1 (25.01 - 08.02)</a:t>
             </a:r>
           </a:p>
           <a:p>
@@ -5148,7 +5148,7 @@
           <p:nvPr>
             <p:extLst>
               <p:ext uri="{D42A27DB-BD31-4B8C-83A1-F6EECF244321}">
-                <p14:modId xmlns:p14="http://schemas.microsoft.com/office/powerpoint/2010/main" val="4055579349"/>
+                <p14:modId xmlns:p14="http://schemas.microsoft.com/office/powerpoint/2010/main" val="1790616886"/>
               </p:ext>
             </p:extLst>
           </p:nvPr>
@@ -5297,7 +5297,7 @@
                       </a:r>
                       <a:r>
                         <a:rPr lang="de-AT" dirty="0"/>
-                        <a:t>, Davare, </a:t>
+                        <a:t>, </a:t>
                       </a:r>
                       <a:r>
                         <a:rPr lang="de-AT" dirty="0" err="1"/>
@@ -5407,7 +5407,7 @@
                       </a:r>
                       <a:r>
                         <a:rPr lang="de-AT" dirty="0"/>
-                        <a:t>, Davare, </a:t>
+                        <a:t>, </a:t>
                       </a:r>
                       <a:r>
                         <a:rPr lang="de-AT" dirty="0" err="1"/>
@@ -5517,7 +5517,7 @@
                       </a:r>
                       <a:r>
                         <a:rPr lang="de-AT" dirty="0"/>
-                        <a:t>, Davare, </a:t>
+                        <a:t>, </a:t>
                       </a:r>
                       <a:r>
                         <a:rPr lang="de-AT" dirty="0" err="1"/>
@@ -5677,18 +5677,9 @@
                     <a:lstStyle/>
                     <a:p>
                       <a:r>
-                        <a:rPr lang="de-AT" dirty="0" err="1"/>
-                        <a:t>Broukx</a:t>
+                        <a:rPr lang="de-AT" dirty="0"/>
+                        <a:t>Davare</a:t>
                       </a:r>
-                      <a:r>
-                        <a:rPr lang="de-AT" dirty="0"/>
-                        <a:t>, </a:t>
-                      </a:r>
-                      <a:r>
-                        <a:rPr lang="de-AT" dirty="0" err="1"/>
-                        <a:t>Grassegger</a:t>
-                      </a:r>
-                      <a:endParaRPr lang="de-AT" dirty="0"/>
                     </a:p>
                   </a:txBody>
                   <a:tcPr/>
@@ -5722,7 +5713,7 @@
                     <a:p>
                       <a:r>
                         <a:rPr lang="de-AT" dirty="0"/>
-                        <a:t>21</a:t>
+                        <a:t>8</a:t>
                       </a:r>
                     </a:p>
                   </a:txBody>
@@ -5776,9 +5767,128 @@
           <a:chExt cx="0" cy="0"/>
         </a:xfrm>
       </p:grpSpPr>
+      <p:sp>
+        <p:nvSpPr>
+          <p:cNvPr id="2" name="Title 1"/>
+          <p:cNvSpPr>
+            <a:spLocks noGrp="1"/>
+          </p:cNvSpPr>
+          <p:nvPr>
+            <p:ph type="title"/>
+          </p:nvPr>
+        </p:nvSpPr>
+        <p:spPr/>
+        <p:txBody>
+          <a:bodyPr/>
+          <a:lstStyle/>
+          <a:p>
+            <a:r>
+              <a:rPr lang="de-DE" altLang="en-US" dirty="0" err="1">
+                <a:latin typeface="Calibri" panose="020F0502020204030204" charset="0"/>
+              </a:rPr>
+              <a:t>Sprint Burndown-Chart</a:t>
+            </a:r>
+            <a:endParaRPr lang="de-DE" altLang="en-US" dirty="0">
+              <a:latin typeface="Calibri" panose="020F0502020204030204" charset="0"/>
+            </a:endParaRPr>
+          </a:p>
+        </p:txBody>
+      </p:sp>
+      <p:sp>
+        <p:nvSpPr>
+          <p:cNvPr id="5" name="TextBox 4"/>
+          <p:cNvSpPr txBox="1"/>
+          <p:nvPr/>
+        </p:nvSpPr>
+        <p:spPr>
+          <a:xfrm>
+            <a:off x="539750" y="1484630"/>
+            <a:ext cx="7060565" cy="307777"/>
+          </a:xfrm>
+          <a:prstGeom prst="rect">
+            <a:avLst/>
+          </a:prstGeom>
+          <a:noFill/>
+        </p:spPr>
+        <p:txBody>
+          <a:bodyPr wrap="square" rtlCol="0">
+            <a:spAutoFit/>
+          </a:bodyPr>
+          <a:lstStyle/>
+          <a:p>
+            <a:r>
+              <a:rPr lang="de-DE" sz="1400" dirty="0">
+                <a:latin typeface="Calibri" panose="020F0502020204030204" charset="0"/>
+                <a:sym typeface="+mn-ea"/>
+              </a:rPr>
+              <a:t>Verbleibende Storypoints in Product Backlog:	81</a:t>
+            </a:r>
+            <a:endParaRPr lang="de-DE" sz="1400" dirty="0">
+              <a:latin typeface="Calibri" panose="020F0502020204030204" charset="0"/>
+            </a:endParaRPr>
+          </a:p>
+        </p:txBody>
+      </p:sp>
+      <p:sp>
+        <p:nvSpPr>
+          <p:cNvPr id="8" name="Footer Placeholder 7"/>
+          <p:cNvSpPr>
+            <a:spLocks noGrp="1"/>
+          </p:cNvSpPr>
+          <p:nvPr>
+            <p:ph type="ftr" sz="quarter" idx="11"/>
+          </p:nvPr>
+        </p:nvSpPr>
+        <p:spPr/>
+        <p:txBody>
+          <a:bodyPr/>
+          <a:lstStyle/>
+          <a:p>
+            <a:pPr>
+              <a:defRPr/>
+            </a:pPr>
+            <a:r>
+              <a:rPr lang="de-DE"/>
+              <a:t>DI(FH) Falkensteiner Markus</a:t>
+            </a:r>
+          </a:p>
+        </p:txBody>
+      </p:sp>
+      <p:sp>
+        <p:nvSpPr>
+          <p:cNvPr id="9" name="Slide Number Placeholder 8"/>
+          <p:cNvSpPr>
+            <a:spLocks noGrp="1"/>
+          </p:cNvSpPr>
+          <p:nvPr>
+            <p:ph type="sldNum" sz="quarter" idx="12"/>
+          </p:nvPr>
+        </p:nvSpPr>
+        <p:spPr/>
+        <p:txBody>
+          <a:bodyPr/>
+          <a:lstStyle/>
+          <a:p>
+            <a:pPr>
+              <a:defRPr/>
+            </a:pPr>
+            <a:fld id="{AE4538FE-AEB4-413B-B741-EC1BAEEF6B8F}" type="slidenum">
+              <a:rPr lang="de-AT" smtClean="0"/>
+              <a:t>4</a:t>
+            </a:fld>
+            <a:endParaRPr lang="de-AT"/>
+          </a:p>
+        </p:txBody>
+      </p:sp>
       <p:pic>
         <p:nvPicPr>
-          <p:cNvPr id="3" name="Picture 2"/>
+          <p:cNvPr id="6" name="Grafik 5">
+            <a:extLst>
+              <a:ext uri="{FF2B5EF4-FFF2-40B4-BE49-F238E27FC236}">
+                <a16:creationId xmlns:a16="http://schemas.microsoft.com/office/drawing/2014/main" id="{9767813E-D244-6D54-EB35-47FF03CF918B}"/>
+              </a:ext>
+            </a:extLst>
+          </p:cNvPr>
           <p:cNvPicPr>
             <a:picLocks noChangeAspect="1"/>
           </p:cNvPicPr>
@@ -5792,161 +5902,14 @@
         </p:blipFill>
         <p:spPr>
           <a:xfrm>
-            <a:off x="1548130" y="2562860"/>
-            <a:ext cx="6724015" cy="3952240"/>
+            <a:off x="725101" y="1792407"/>
+            <a:ext cx="7693797" cy="4436223"/>
           </a:xfrm>
           <a:prstGeom prst="rect">
             <a:avLst/>
           </a:prstGeom>
         </p:spPr>
       </p:pic>
-      <p:sp>
-        <p:nvSpPr>
-          <p:cNvPr id="2" name="Title 1"/>
-          <p:cNvSpPr>
-            <a:spLocks noGrp="1"/>
-          </p:cNvSpPr>
-          <p:nvPr>
-            <p:ph type="title"/>
-          </p:nvPr>
-        </p:nvSpPr>
-        <p:spPr/>
-        <p:txBody>
-          <a:bodyPr/>
-          <a:lstStyle/>
-          <a:p>
-            <a:r>
-              <a:rPr lang="de-DE" altLang="en-US" dirty="0" err="1">
-                <a:latin typeface="Calibri" panose="020F0502020204030204" charset="0"/>
-              </a:rPr>
-              <a:t>Sprint Burndown-Chart</a:t>
-            </a:r>
-            <a:endParaRPr lang="de-DE" altLang="en-US" dirty="0">
-              <a:latin typeface="Calibri" panose="020F0502020204030204" charset="0"/>
-            </a:endParaRPr>
-          </a:p>
-        </p:txBody>
-      </p:sp>
-      <p:sp>
-        <p:nvSpPr>
-          <p:cNvPr id="5" name="TextBox 4"/>
-          <p:cNvSpPr txBox="1"/>
-          <p:nvPr/>
-        </p:nvSpPr>
-        <p:spPr>
-          <a:xfrm>
-            <a:off x="539750" y="1484630"/>
-            <a:ext cx="7060565" cy="1383665"/>
-          </a:xfrm>
-          <a:prstGeom prst="rect">
-            <a:avLst/>
-          </a:prstGeom>
-          <a:noFill/>
-        </p:spPr>
-        <p:txBody>
-          <a:bodyPr wrap="square" rtlCol="0">
-            <a:spAutoFit/>
-          </a:bodyPr>
-          <a:lstStyle/>
-          <a:p>
-            <a:r>
-              <a:rPr lang="de-DE" sz="1400" dirty="0">
-                <a:latin typeface="Calibri" panose="020F0502020204030204" charset="0"/>
-              </a:rPr>
-              <a:t>Geplante Storypoints:	27</a:t>
-            </a:r>
-          </a:p>
-          <a:p>
-            <a:r>
-              <a:rPr lang="de-DE" sz="1400" dirty="0">
-                <a:latin typeface="Calibri" panose="020F0502020204030204" charset="0"/>
-              </a:rPr>
-              <a:t>Erledigte Storypoints:	6</a:t>
-            </a:r>
-          </a:p>
-          <a:p>
-            <a:r>
-              <a:rPr lang="de-DE" sz="1400" dirty="0">
-                <a:latin typeface="Calibri" panose="020F0502020204030204" charset="0"/>
-              </a:rPr>
-              <a:t>Offene Storypoints:	21</a:t>
-            </a:r>
-          </a:p>
-          <a:p>
-            <a:endParaRPr lang="de-DE" sz="1400" dirty="0">
-              <a:latin typeface="Calibri" panose="020F0502020204030204" charset="0"/>
-            </a:endParaRPr>
-          </a:p>
-          <a:p>
-            <a:r>
-              <a:rPr lang="de-DE" sz="1400" dirty="0">
-                <a:latin typeface="Calibri" panose="020F0502020204030204" charset="0"/>
-                <a:sym typeface="+mn-ea"/>
-              </a:rPr>
-              <a:t>Verbleibende Storypoints in Product Backlog:	102</a:t>
-            </a:r>
-            <a:endParaRPr lang="de-DE" sz="1400" dirty="0">
-              <a:latin typeface="Calibri" panose="020F0502020204030204" charset="0"/>
-            </a:endParaRPr>
-          </a:p>
-          <a:p>
-            <a:endParaRPr lang="de-DE" sz="1400" dirty="0">
-              <a:latin typeface="Calibri" panose="020F0502020204030204" charset="0"/>
-            </a:endParaRPr>
-          </a:p>
-        </p:txBody>
-      </p:sp>
-      <p:sp>
-        <p:nvSpPr>
-          <p:cNvPr id="8" name="Footer Placeholder 7"/>
-          <p:cNvSpPr>
-            <a:spLocks noGrp="1"/>
-          </p:cNvSpPr>
-          <p:nvPr>
-            <p:ph type="ftr" sz="quarter" idx="11"/>
-          </p:nvPr>
-        </p:nvSpPr>
-        <p:spPr/>
-        <p:txBody>
-          <a:bodyPr/>
-          <a:lstStyle/>
-          <a:p>
-            <a:pPr>
-              <a:defRPr/>
-            </a:pPr>
-            <a:r>
-              <a:rPr lang="de-DE"/>
-              <a:t>DI(FH) Falkensteiner Markus</a:t>
-            </a:r>
-          </a:p>
-        </p:txBody>
-      </p:sp>
-      <p:sp>
-        <p:nvSpPr>
-          <p:cNvPr id="9" name="Slide Number Placeholder 8"/>
-          <p:cNvSpPr>
-            <a:spLocks noGrp="1"/>
-          </p:cNvSpPr>
-          <p:nvPr>
-            <p:ph type="sldNum" sz="quarter" idx="12"/>
-          </p:nvPr>
-        </p:nvSpPr>
-        <p:spPr/>
-        <p:txBody>
-          <a:bodyPr/>
-          <a:lstStyle/>
-          <a:p>
-            <a:pPr>
-              <a:defRPr/>
-            </a:pPr>
-            <a:fld id="{AE4538FE-AEB4-413B-B741-EC1BAEEF6B8F}" type="slidenum">
-              <a:rPr lang="de-AT" smtClean="0"/>
-              <a:t>4</a:t>
-            </a:fld>
-            <a:endParaRPr lang="de-AT"/>
-          </a:p>
-        </p:txBody>
-      </p:sp>
     </p:spTree>
   </p:cSld>
   <p:clrMapOvr>
@@ -5972,9 +5935,124 @@
           <a:chExt cx="0" cy="0"/>
         </a:xfrm>
       </p:grpSpPr>
+      <p:sp>
+        <p:nvSpPr>
+          <p:cNvPr id="2" name="Title 1"/>
+          <p:cNvSpPr>
+            <a:spLocks noGrp="1"/>
+          </p:cNvSpPr>
+          <p:nvPr>
+            <p:ph type="title"/>
+          </p:nvPr>
+        </p:nvSpPr>
+        <p:spPr/>
+        <p:txBody>
+          <a:bodyPr/>
+          <a:lstStyle/>
+          <a:p>
+            <a:r>
+              <a:rPr lang="de-DE" altLang="en-US" dirty="0" err="1">
+                <a:latin typeface="Calibri" panose="020F0502020204030204" charset="0"/>
+              </a:rPr>
+              <a:t>Sprint Velocity</a:t>
+            </a:r>
+            <a:endParaRPr lang="de-DE" altLang="en-US" dirty="0">
+              <a:latin typeface="Calibri" panose="020F0502020204030204" charset="0"/>
+            </a:endParaRPr>
+          </a:p>
+        </p:txBody>
+      </p:sp>
+      <p:sp>
+        <p:nvSpPr>
+          <p:cNvPr id="5" name="TextBox 4"/>
+          <p:cNvSpPr txBox="1"/>
+          <p:nvPr/>
+        </p:nvSpPr>
+        <p:spPr>
+          <a:xfrm>
+            <a:off x="539750" y="1484630"/>
+            <a:ext cx="7060565" cy="307777"/>
+          </a:xfrm>
+          <a:prstGeom prst="rect">
+            <a:avLst/>
+          </a:prstGeom>
+          <a:noFill/>
+        </p:spPr>
+        <p:txBody>
+          <a:bodyPr wrap="square" rtlCol="0">
+            <a:spAutoFit/>
+          </a:bodyPr>
+          <a:lstStyle/>
+          <a:p>
+            <a:r>
+              <a:rPr lang="de-DE" sz="1400" dirty="0">
+                <a:latin typeface="Calibri" panose="020F0502020204030204" charset="0"/>
+              </a:rPr>
+              <a:t>Velocity Sprint 1:	6</a:t>
+            </a:r>
+          </a:p>
+        </p:txBody>
+      </p:sp>
+      <p:sp>
+        <p:nvSpPr>
+          <p:cNvPr id="8" name="Footer Placeholder 7"/>
+          <p:cNvSpPr>
+            <a:spLocks noGrp="1"/>
+          </p:cNvSpPr>
+          <p:nvPr>
+            <p:ph type="ftr" sz="quarter" idx="11"/>
+          </p:nvPr>
+        </p:nvSpPr>
+        <p:spPr/>
+        <p:txBody>
+          <a:bodyPr/>
+          <a:lstStyle/>
+          <a:p>
+            <a:pPr>
+              <a:defRPr/>
+            </a:pPr>
+            <a:r>
+              <a:rPr lang="de-DE"/>
+              <a:t>DI(FH) Falkensteiner Markus</a:t>
+            </a:r>
+          </a:p>
+        </p:txBody>
+      </p:sp>
+      <p:sp>
+        <p:nvSpPr>
+          <p:cNvPr id="9" name="Slide Number Placeholder 8"/>
+          <p:cNvSpPr>
+            <a:spLocks noGrp="1"/>
+          </p:cNvSpPr>
+          <p:nvPr>
+            <p:ph type="sldNum" sz="quarter" idx="12"/>
+          </p:nvPr>
+        </p:nvSpPr>
+        <p:spPr/>
+        <p:txBody>
+          <a:bodyPr/>
+          <a:lstStyle/>
+          <a:p>
+            <a:pPr>
+              <a:defRPr/>
+            </a:pPr>
+            <a:fld id="{AE4538FE-AEB4-413B-B741-EC1BAEEF6B8F}" type="slidenum">
+              <a:rPr lang="de-AT" smtClean="0"/>
+              <a:t>5</a:t>
+            </a:fld>
+            <a:endParaRPr lang="de-AT"/>
+          </a:p>
+        </p:txBody>
+      </p:sp>
       <p:pic>
         <p:nvPicPr>
-          <p:cNvPr id="4" name="Picture 3"/>
+          <p:cNvPr id="6" name="Grafik 5">
+            <a:extLst>
+              <a:ext uri="{FF2B5EF4-FFF2-40B4-BE49-F238E27FC236}">
+                <a16:creationId xmlns:a16="http://schemas.microsoft.com/office/drawing/2014/main" id="{62584EEB-EADB-49C7-EE94-3C88641BCEE9}"/>
+              </a:ext>
+            </a:extLst>
+          </p:cNvPr>
           <p:cNvPicPr>
             <a:picLocks noChangeAspect="1"/>
           </p:cNvPicPr>
@@ -5988,123 +6066,14 @@
         </p:blipFill>
         <p:spPr>
           <a:xfrm>
-            <a:off x="1115695" y="2276475"/>
-            <a:ext cx="6347460" cy="3899535"/>
+            <a:off x="1232830" y="2076489"/>
+            <a:ext cx="6678339" cy="3995779"/>
           </a:xfrm>
           <a:prstGeom prst="rect">
             <a:avLst/>
           </a:prstGeom>
         </p:spPr>
       </p:pic>
-      <p:sp>
-        <p:nvSpPr>
-          <p:cNvPr id="2" name="Title 1"/>
-          <p:cNvSpPr>
-            <a:spLocks noGrp="1"/>
-          </p:cNvSpPr>
-          <p:nvPr>
-            <p:ph type="title"/>
-          </p:nvPr>
-        </p:nvSpPr>
-        <p:spPr/>
-        <p:txBody>
-          <a:bodyPr/>
-          <a:lstStyle/>
-          <a:p>
-            <a:r>
-              <a:rPr lang="de-DE" altLang="en-US" dirty="0" err="1">
-                <a:latin typeface="Calibri" panose="020F0502020204030204" charset="0"/>
-              </a:rPr>
-              <a:t>Sprint Velocity</a:t>
-            </a:r>
-            <a:endParaRPr lang="de-DE" altLang="en-US" dirty="0">
-              <a:latin typeface="Calibri" panose="020F0502020204030204" charset="0"/>
-            </a:endParaRPr>
-          </a:p>
-        </p:txBody>
-      </p:sp>
-      <p:sp>
-        <p:nvSpPr>
-          <p:cNvPr id="5" name="TextBox 4"/>
-          <p:cNvSpPr txBox="1"/>
-          <p:nvPr/>
-        </p:nvSpPr>
-        <p:spPr>
-          <a:xfrm>
-            <a:off x="539750" y="1484630"/>
-            <a:ext cx="7060565" cy="307777"/>
-          </a:xfrm>
-          <a:prstGeom prst="rect">
-            <a:avLst/>
-          </a:prstGeom>
-          <a:noFill/>
-        </p:spPr>
-        <p:txBody>
-          <a:bodyPr wrap="square" rtlCol="0">
-            <a:spAutoFit/>
-          </a:bodyPr>
-          <a:lstStyle/>
-          <a:p>
-            <a:r>
-              <a:rPr lang="de-DE" sz="1400" dirty="0">
-                <a:latin typeface="Calibri" panose="020F0502020204030204" charset="0"/>
-              </a:rPr>
-              <a:t>Velocity Sprint 1:	6</a:t>
-            </a:r>
-          </a:p>
-        </p:txBody>
-      </p:sp>
-      <p:sp>
-        <p:nvSpPr>
-          <p:cNvPr id="8" name="Footer Placeholder 7"/>
-          <p:cNvSpPr>
-            <a:spLocks noGrp="1"/>
-          </p:cNvSpPr>
-          <p:nvPr>
-            <p:ph type="ftr" sz="quarter" idx="11"/>
-          </p:nvPr>
-        </p:nvSpPr>
-        <p:spPr/>
-        <p:txBody>
-          <a:bodyPr/>
-          <a:lstStyle/>
-          <a:p>
-            <a:pPr>
-              <a:defRPr/>
-            </a:pPr>
-            <a:r>
-              <a:rPr lang="de-DE"/>
-              <a:t>DI(FH) Falkensteiner Markus</a:t>
-            </a:r>
-          </a:p>
-        </p:txBody>
-      </p:sp>
-      <p:sp>
-        <p:nvSpPr>
-          <p:cNvPr id="9" name="Slide Number Placeholder 8"/>
-          <p:cNvSpPr>
-            <a:spLocks noGrp="1"/>
-          </p:cNvSpPr>
-          <p:nvPr>
-            <p:ph type="sldNum" sz="quarter" idx="12"/>
-          </p:nvPr>
-        </p:nvSpPr>
-        <p:spPr/>
-        <p:txBody>
-          <a:bodyPr/>
-          <a:lstStyle/>
-          <a:p>
-            <a:pPr>
-              <a:defRPr/>
-            </a:pPr>
-            <a:fld id="{AE4538FE-AEB4-413B-B741-EC1BAEEF6B8F}" type="slidenum">
-              <a:rPr lang="de-AT" smtClean="0"/>
-              <a:t>5</a:t>
-            </a:fld>
-            <a:endParaRPr lang="de-AT"/>
-          </a:p>
-        </p:txBody>
-      </p:sp>
     </p:spTree>
   </p:cSld>
   <p:clrMapOvr>
@@ -6159,92 +6128,6 @@
       </p:sp>
       <p:sp>
         <p:nvSpPr>
-          <p:cNvPr id="5" name="TextBox 4"/>
-          <p:cNvSpPr txBox="1"/>
-          <p:nvPr/>
-        </p:nvSpPr>
-        <p:spPr>
-          <a:xfrm>
-            <a:off x="539750" y="1484630"/>
-            <a:ext cx="7945755" cy="2031325"/>
-          </a:xfrm>
-          <a:prstGeom prst="rect">
-            <a:avLst/>
-          </a:prstGeom>
-          <a:noFill/>
-        </p:spPr>
-        <p:txBody>
-          <a:bodyPr wrap="square" rtlCol="0">
-            <a:spAutoFit/>
-          </a:bodyPr>
-          <a:lstStyle/>
-          <a:p>
-            <a:r>
-              <a:rPr lang="de-DE" sz="1400" dirty="0">
-                <a:latin typeface="Calibri" panose="020F0502020204030204" charset="0"/>
-              </a:rPr>
-              <a:t>Mitarbeiter 1:</a:t>
-            </a:r>
-          </a:p>
-          <a:p>
-            <a:r>
-              <a:rPr lang="de-DE" sz="1400" dirty="0">
-                <a:latin typeface="Calibri" panose="020F0502020204030204" charset="0"/>
-              </a:rPr>
-              <a:t>	Raspberry Pi aufgesetzt.</a:t>
-            </a:r>
-          </a:p>
-          <a:p>
-            <a:endParaRPr lang="de-DE" sz="1400" dirty="0">
-              <a:latin typeface="Calibri" panose="020F0502020204030204" charset="0"/>
-            </a:endParaRPr>
-          </a:p>
-          <a:p>
-            <a:r>
-              <a:rPr lang="de-DE" sz="1400" dirty="0">
-                <a:latin typeface="Calibri" panose="020F0502020204030204" charset="0"/>
-              </a:rPr>
-              <a:t>Mitarbeiter 2:</a:t>
-            </a:r>
-          </a:p>
-          <a:p>
-            <a:r>
-              <a:rPr lang="de-DE" sz="1400" dirty="0">
-                <a:latin typeface="Calibri" panose="020F0502020204030204" charset="0"/>
-              </a:rPr>
-              <a:t>	Mockup Screens</a:t>
-            </a:r>
-          </a:p>
-          <a:p>
-            <a:endParaRPr lang="de-DE" sz="1400" dirty="0">
-              <a:latin typeface="Calibri" panose="020F0502020204030204" charset="0"/>
-            </a:endParaRPr>
-          </a:p>
-          <a:p>
-            <a:r>
-              <a:rPr lang="de-DE" sz="1400" dirty="0">
-                <a:latin typeface="Calibri" panose="020F0502020204030204" charset="0"/>
-              </a:rPr>
-              <a:t>Mitarbeiter 3:</a:t>
-            </a:r>
-          </a:p>
-          <a:p>
-            <a:r>
-              <a:rPr lang="de-DE" sz="1400" dirty="0">
-                <a:latin typeface="Calibri" panose="020F0502020204030204" charset="0"/>
-              </a:rPr>
-              <a:t>	Datenbankschema</a:t>
-            </a:r>
-          </a:p>
-          <a:p>
-            <a:endParaRPr lang="de-DE" sz="1400" dirty="0">
-              <a:latin typeface="Calibri" panose="020F0502020204030204" charset="0"/>
-            </a:endParaRPr>
-          </a:p>
-        </p:txBody>
-      </p:sp>
-      <p:sp>
-        <p:nvSpPr>
           <p:cNvPr id="8" name="Footer Placeholder 7"/>
           <p:cNvSpPr>
             <a:spLocks noGrp="1"/>
@@ -6294,6 +6177,193 @@
           </a:p>
         </p:txBody>
       </p:sp>
+      <p:pic>
+        <p:nvPicPr>
+          <p:cNvPr id="1028" name="Picture 4">
+            <a:extLst>
+              <a:ext uri="{FF2B5EF4-FFF2-40B4-BE49-F238E27FC236}">
+                <a16:creationId xmlns:a16="http://schemas.microsoft.com/office/drawing/2014/main" id="{0C7D5F32-A049-6DDF-343F-31800203550A}"/>
+              </a:ext>
+            </a:extLst>
+          </p:cNvPr>
+          <p:cNvPicPr>
+            <a:picLocks noChangeAspect="1" noChangeArrowheads="1"/>
+          </p:cNvPicPr>
+          <p:nvPr/>
+        </p:nvPicPr>
+        <p:blipFill>
+          <a:blip r:embed="rId2">
+            <a:extLst>
+              <a:ext uri="{28A0092B-C50C-407E-A947-70E740481C1C}">
+                <a14:useLocalDpi xmlns:a14="http://schemas.microsoft.com/office/drawing/2010/main" val="0"/>
+              </a:ext>
+            </a:extLst>
+          </a:blip>
+          <a:srcRect/>
+          <a:stretch>
+            <a:fillRect/>
+          </a:stretch>
+        </p:blipFill>
+        <p:spPr bwMode="auto">
+          <a:xfrm>
+            <a:off x="2227697" y="1146744"/>
+            <a:ext cx="4213051" cy="1888609"/>
+          </a:xfrm>
+          <a:prstGeom prst="rect">
+            <a:avLst/>
+          </a:prstGeom>
+          <a:noFill/>
+          <a:extLst>
+            <a:ext uri="{909E8E84-426E-40DD-AFC4-6F175D3DCCD1}">
+              <a14:hiddenFill xmlns:a14="http://schemas.microsoft.com/office/drawing/2010/main">
+                <a:solidFill>
+                  <a:srgbClr val="FFFFFF"/>
+                </a:solidFill>
+              </a14:hiddenFill>
+            </a:ext>
+          </a:extLst>
+        </p:spPr>
+      </p:pic>
+      <p:sp>
+        <p:nvSpPr>
+          <p:cNvPr id="3" name="Pfeil: nach rechts 2">
+            <a:extLst>
+              <a:ext uri="{FF2B5EF4-FFF2-40B4-BE49-F238E27FC236}">
+                <a16:creationId xmlns:a16="http://schemas.microsoft.com/office/drawing/2014/main" id="{300D5EAD-D5D2-F5B9-56B5-F033B3CA959C}"/>
+              </a:ext>
+            </a:extLst>
+          </p:cNvPr>
+          <p:cNvSpPr/>
+          <p:nvPr/>
+        </p:nvSpPr>
+        <p:spPr>
+          <a:xfrm rot="5400000">
+            <a:off x="4175956" y="3060615"/>
+            <a:ext cx="792088" cy="864096"/>
+          </a:xfrm>
+          <a:prstGeom prst="rightArrow">
+            <a:avLst/>
+          </a:prstGeom>
+        </p:spPr>
+        <p:style>
+          <a:lnRef idx="2">
+            <a:schemeClr val="accent1">
+              <a:shade val="50000"/>
+            </a:schemeClr>
+          </a:lnRef>
+          <a:fillRef idx="1">
+            <a:schemeClr val="accent1"/>
+          </a:fillRef>
+          <a:effectRef idx="0">
+            <a:schemeClr val="accent1"/>
+          </a:effectRef>
+          <a:fontRef idx="minor">
+            <a:schemeClr val="lt1"/>
+          </a:fontRef>
+        </p:style>
+        <p:txBody>
+          <a:bodyPr rtlCol="0" anchor="ctr"/>
+          <a:lstStyle/>
+          <a:p>
+            <a:pPr algn="ctr"/>
+            <a:endParaRPr lang="de-AT"/>
+          </a:p>
+        </p:txBody>
+      </p:sp>
+      <p:pic>
+        <p:nvPicPr>
+          <p:cNvPr id="1030" name="Picture 6">
+            <a:extLst>
+              <a:ext uri="{FF2B5EF4-FFF2-40B4-BE49-F238E27FC236}">
+                <a16:creationId xmlns:a16="http://schemas.microsoft.com/office/drawing/2014/main" id="{53C715F4-CBF4-6758-8292-1BF6A6BC6401}"/>
+              </a:ext>
+            </a:extLst>
+          </p:cNvPr>
+          <p:cNvPicPr>
+            <a:picLocks noChangeAspect="1" noChangeArrowheads="1"/>
+          </p:cNvPicPr>
+          <p:nvPr/>
+        </p:nvPicPr>
+        <p:blipFill>
+          <a:blip r:embed="rId3">
+            <a:extLst>
+              <a:ext uri="{28A0092B-C50C-407E-A947-70E740481C1C}">
+                <a14:useLocalDpi xmlns:a14="http://schemas.microsoft.com/office/drawing/2010/main" val="0"/>
+              </a:ext>
+            </a:extLst>
+          </a:blip>
+          <a:srcRect/>
+          <a:stretch>
+            <a:fillRect/>
+          </a:stretch>
+        </p:blipFill>
+        <p:spPr bwMode="auto">
+          <a:xfrm>
+            <a:off x="350358" y="3992292"/>
+            <a:ext cx="8443284" cy="1001563"/>
+          </a:xfrm>
+          <a:prstGeom prst="rect">
+            <a:avLst/>
+          </a:prstGeom>
+          <a:noFill/>
+          <a:extLst>
+            <a:ext uri="{909E8E84-426E-40DD-AFC4-6F175D3DCCD1}">
+              <a14:hiddenFill xmlns:a14="http://schemas.microsoft.com/office/drawing/2010/main">
+                <a:solidFill>
+                  <a:srgbClr val="FFFFFF"/>
+                </a:solidFill>
+              </a14:hiddenFill>
+            </a:ext>
+          </a:extLst>
+        </p:spPr>
+      </p:pic>
+      <p:pic>
+        <p:nvPicPr>
+          <p:cNvPr id="1034" name="Picture 10">
+            <a:extLst>
+              <a:ext uri="{FF2B5EF4-FFF2-40B4-BE49-F238E27FC236}">
+                <a16:creationId xmlns:a16="http://schemas.microsoft.com/office/drawing/2014/main" id="{6B8899FA-4C76-26B0-51F1-D71F3F25D84D}"/>
+              </a:ext>
+            </a:extLst>
+          </p:cNvPr>
+          <p:cNvPicPr>
+            <a:picLocks noChangeAspect="1" noChangeArrowheads="1"/>
+          </p:cNvPicPr>
+          <p:nvPr/>
+        </p:nvPicPr>
+        <p:blipFill>
+          <a:blip r:embed="rId4">
+            <a:extLst>
+              <a:ext uri="{28A0092B-C50C-407E-A947-70E740481C1C}">
+                <a14:useLocalDpi xmlns:a14="http://schemas.microsoft.com/office/drawing/2010/main" val="0"/>
+              </a:ext>
+            </a:extLst>
+          </a:blip>
+          <a:srcRect/>
+          <a:stretch>
+            <a:fillRect/>
+          </a:stretch>
+        </p:blipFill>
+        <p:spPr bwMode="auto">
+          <a:xfrm>
+            <a:off x="350358" y="5157192"/>
+            <a:ext cx="8443284" cy="931009"/>
+          </a:xfrm>
+          <a:prstGeom prst="rect">
+            <a:avLst/>
+          </a:prstGeom>
+          <a:noFill/>
+          <a:extLst>
+            <a:ext uri="{909E8E84-426E-40DD-AFC4-6F175D3DCCD1}">
+              <a14:hiddenFill xmlns:a14="http://schemas.microsoft.com/office/drawing/2010/main">
+                <a:solidFill>
+                  <a:srgbClr val="FFFFFF"/>
+                </a:solidFill>
+              </a14:hiddenFill>
+            </a:ext>
+          </a:extLst>
+        </p:spPr>
+      </p:pic>
     </p:spTree>
   </p:cSld>
   <p:clrMapOvr>
@@ -7113,15 +7183,6 @@
 </file>
 
 <file path=customXml/item1.xml><?xml version="1.0" encoding="utf-8"?>
-<?mso-contentType ?>
-<FormTemplates xmlns="http://schemas.microsoft.com/sharepoint/v3/contenttype/forms">
-  <Display>DocumentLibraryForm</Display>
-  <Edit>DocumentLibraryForm</Edit>
-  <New>DocumentLibraryForm</New>
-</FormTemplates>
-</file>
-
-<file path=customXml/item2.xml><?xml version="1.0" encoding="utf-8"?>
 <ct:contentTypeSchema xmlns:ct="http://schemas.microsoft.com/office/2006/metadata/contentType" xmlns:ma="http://schemas.microsoft.com/office/2006/metadata/properties/metaAttributes" ct:_="" ma:_="" ma:contentTypeName="Document" ma:contentTypeID="0x010100F96FFEA2697AA44F9422BCE6ED89663D" ma:contentTypeVersion="4" ma:contentTypeDescription="Create a new document." ma:contentTypeScope="" ma:versionID="0156547c995f25b471677d110e54b618">
   <xsd:schema xmlns:xsd="http://www.w3.org/2001/XMLSchema" xmlns:xs="http://www.w3.org/2001/XMLSchema" xmlns:p="http://schemas.microsoft.com/office/2006/metadata/properties" xmlns:ns2="b7917097-4313-4589-aaf3-1c556b28fe5d" xmlns:ns3="535c1d6f-a806-407c-9432-16e2583423a1" targetNamespace="http://schemas.microsoft.com/office/2006/metadata/properties" ma:root="true" ma:fieldsID="2c66bfdb59d4a9974c7ea90bbcac24e5" ns2:_="" ns3:_="">
     <xsd:import namespace="b7917097-4313-4589-aaf3-1c556b28fe5d"/>
@@ -7286,15 +7347,16 @@
 </ct:contentTypeSchema>
 </file>
 
-<file path=customXml/itemProps1.xml><?xml version="1.0" encoding="utf-8"?>
-<ds:datastoreItem xmlns:ds="http://schemas.openxmlformats.org/officeDocument/2006/customXml" ds:itemID="{75DA91AF-B18D-4223-9DA5-502A6FAA2CC9}">
-  <ds:schemaRefs>
-    <ds:schemaRef ds:uri="http://schemas.microsoft.com/sharepoint/v3/contenttype/forms"/>
-  </ds:schemaRefs>
-</ds:datastoreItem>
+<file path=customXml/item2.xml><?xml version="1.0" encoding="utf-8"?>
+<?mso-contentType ?>
+<FormTemplates xmlns="http://schemas.microsoft.com/sharepoint/v3/contenttype/forms">
+  <Display>DocumentLibraryForm</Display>
+  <Edit>DocumentLibraryForm</Edit>
+  <New>DocumentLibraryForm</New>
+</FormTemplates>
 </file>
 
-<file path=customXml/itemProps2.xml><?xml version="1.0" encoding="utf-8"?>
+<file path=customXml/itemProps1.xml><?xml version="1.0" encoding="utf-8"?>
 <ds:datastoreItem xmlns:ds="http://schemas.openxmlformats.org/officeDocument/2006/customXml" ds:itemID="{B01F0016-C097-448B-867E-52571F2257D5}">
   <ds:schemaRefs>
     <ds:schemaRef ds:uri="http://schemas.microsoft.com/office/2006/metadata/contentType"/>
@@ -7311,4 +7373,12 @@
     <ds:schemaRef ds:uri="http://schemas.microsoft.com/internal/obd"/>
   </ds:schemaRefs>
 </ds:datastoreItem>
+</file>
+
+<file path=customXml/itemProps2.xml><?xml version="1.0" encoding="utf-8"?>
+<ds:datastoreItem xmlns:ds="http://schemas.openxmlformats.org/officeDocument/2006/customXml" ds:itemID="{75DA91AF-B18D-4223-9DA5-502A6FAA2CC9}">
+  <ds:schemaRefs>
+    <ds:schemaRef ds:uri="http://schemas.microsoft.com/sharepoint/v3/contenttype/forms"/>
+  </ds:schemaRefs>
+</ds:datastoreItem>
 </file>
</xml_diff>